<commit_message>
Adding updated poster on github
</commit_message>
<xml_diff>
--- a/Presentation/4630_DividendPres_v1.pptx
+++ b/Presentation/4630_DividendPres_v1.pptx
@@ -1279,7 +1279,7 @@
             <a:fld id="{1160EA64-D806-43AC-9DF2-F8C432F32B4C}" type="datetimeFigureOut">
               <a:rPr lang="en-US" smtClean="0"/>
               <a:pPr/>
-              <a:t>12/5/22</a:t>
+              <a:t>12/13/22</a:t>
             </a:fld>
             <a:endParaRPr lang="en-US" dirty="0"/>
           </a:p>
@@ -1569,7 +1569,7 @@
             <a:fld id="{1160EA64-D806-43AC-9DF2-F8C432F32B4C}" type="datetimeFigureOut">
               <a:rPr lang="en-US" smtClean="0"/>
               <a:pPr/>
-              <a:t>12/5/22</a:t>
+              <a:t>12/13/22</a:t>
             </a:fld>
             <a:endParaRPr lang="en-US" dirty="0"/>
           </a:p>
@@ -1766,7 +1766,7 @@
             <a:fld id="{1160EA64-D806-43AC-9DF2-F8C432F32B4C}" type="datetimeFigureOut">
               <a:rPr lang="en-US" smtClean="0"/>
               <a:pPr/>
-              <a:t>12/5/22</a:t>
+              <a:t>12/13/22</a:t>
             </a:fld>
             <a:endParaRPr lang="en-US" dirty="0"/>
           </a:p>
@@ -2042,7 +2042,7 @@
             <a:fld id="{1160EA64-D806-43AC-9DF2-F8C432F32B4C}" type="datetimeFigureOut">
               <a:rPr lang="en-US" smtClean="0"/>
               <a:pPr/>
-              <a:t>12/5/22</a:t>
+              <a:t>12/13/22</a:t>
             </a:fld>
             <a:endParaRPr lang="en-US" dirty="0"/>
           </a:p>
@@ -2386,7 +2386,7 @@
             <a:fld id="{1160EA64-D806-43AC-9DF2-F8C432F32B4C}" type="datetimeFigureOut">
               <a:rPr lang="en-US" smtClean="0"/>
               <a:pPr/>
-              <a:t>12/5/22</a:t>
+              <a:t>12/13/22</a:t>
             </a:fld>
             <a:endParaRPr lang="en-US" dirty="0"/>
           </a:p>
@@ -3012,7 +3012,7 @@
             <a:fld id="{1160EA64-D806-43AC-9DF2-F8C432F32B4C}" type="datetimeFigureOut">
               <a:rPr lang="en-US" smtClean="0"/>
               <a:pPr/>
-              <a:t>12/5/22</a:t>
+              <a:t>12/13/22</a:t>
             </a:fld>
             <a:endParaRPr lang="en-US" dirty="0"/>
           </a:p>
@@ -3875,7 +3875,7 @@
             <a:fld id="{1160EA64-D806-43AC-9DF2-F8C432F32B4C}" type="datetimeFigureOut">
               <a:rPr lang="en-US" smtClean="0"/>
               <a:pPr/>
-              <a:t>12/5/22</a:t>
+              <a:t>12/13/22</a:t>
             </a:fld>
             <a:endParaRPr lang="en-US" dirty="0"/>
           </a:p>
@@ -4048,7 +4048,7 @@
             <a:fld id="{1160EA64-D806-43AC-9DF2-F8C432F32B4C}" type="datetimeFigureOut">
               <a:rPr lang="en-US" smtClean="0"/>
               <a:pPr/>
-              <a:t>12/5/22</a:t>
+              <a:t>12/13/22</a:t>
             </a:fld>
             <a:endParaRPr lang="en-US" dirty="0"/>
           </a:p>
@@ -4243,7 +4243,7 @@
             <a:fld id="{1160EA64-D806-43AC-9DF2-F8C432F32B4C}" type="datetimeFigureOut">
               <a:rPr lang="en-US" smtClean="0"/>
               <a:pPr/>
-              <a:t>12/5/22</a:t>
+              <a:t>12/13/22</a:t>
             </a:fld>
             <a:endParaRPr lang="en-US" dirty="0"/>
           </a:p>
@@ -4428,7 +4428,7 @@
             <a:fld id="{1160EA64-D806-43AC-9DF2-F8C432F32B4C}" type="datetimeFigureOut">
               <a:rPr lang="en-US" smtClean="0"/>
               <a:pPr/>
-              <a:t>12/5/22</a:t>
+              <a:t>12/13/22</a:t>
             </a:fld>
             <a:endParaRPr lang="en-US" dirty="0"/>
           </a:p>
@@ -4690,7 +4690,7 @@
             <a:fld id="{1160EA64-D806-43AC-9DF2-F8C432F32B4C}" type="datetimeFigureOut">
               <a:rPr lang="en-US" smtClean="0"/>
               <a:pPr/>
-              <a:t>12/5/22</a:t>
+              <a:t>12/13/22</a:t>
             </a:fld>
             <a:endParaRPr lang="en-US" dirty="0"/>
           </a:p>
@@ -4997,7 +4997,7 @@
             <a:fld id="{1160EA64-D806-43AC-9DF2-F8C432F32B4C}" type="datetimeFigureOut">
               <a:rPr lang="en-US" smtClean="0"/>
               <a:pPr/>
-              <a:t>12/5/22</a:t>
+              <a:t>12/13/22</a:t>
             </a:fld>
             <a:endParaRPr lang="en-US" dirty="0"/>
           </a:p>
@@ -5456,7 +5456,7 @@
             <a:fld id="{1160EA64-D806-43AC-9DF2-F8C432F32B4C}" type="datetimeFigureOut">
               <a:rPr lang="en-US" smtClean="0"/>
               <a:pPr/>
-              <a:t>12/5/22</a:t>
+              <a:t>12/13/22</a:t>
             </a:fld>
             <a:endParaRPr lang="en-US" dirty="0"/>
           </a:p>
@@ -5588,7 +5588,7 @@
           <a:p>
             <a:fld id="{E1037C31-9E7A-4F99-8774-A0E530DE1A42}" type="datetimeFigureOut">
               <a:rPr lang="en-US" smtClean="0"/>
-              <a:t>12/5/22</a:t>
+              <a:t>12/13/22</a:t>
             </a:fld>
             <a:endParaRPr lang="en-US" dirty="0"/>
           </a:p>
@@ -5696,7 +5696,7 @@
           <a:p>
             <a:fld id="{C278504F-A551-4DE0-9316-4DCD1D8CC752}" type="datetimeFigureOut">
               <a:rPr lang="en-US" smtClean="0"/>
-              <a:t>12/5/22</a:t>
+              <a:t>12/13/22</a:t>
             </a:fld>
             <a:endParaRPr lang="en-US" dirty="0"/>
           </a:p>
@@ -5988,7 +5988,7 @@
             <a:fld id="{1160EA64-D806-43AC-9DF2-F8C432F32B4C}" type="datetimeFigureOut">
               <a:rPr lang="en-US" smtClean="0"/>
               <a:pPr/>
-              <a:t>12/5/22</a:t>
+              <a:t>12/13/22</a:t>
             </a:fld>
             <a:endParaRPr lang="en-US" dirty="0"/>
           </a:p>
@@ -6278,7 +6278,7 @@
             <a:fld id="{1160EA64-D806-43AC-9DF2-F8C432F32B4C}" type="datetimeFigureOut">
               <a:rPr lang="en-US" smtClean="0"/>
               <a:pPr/>
-              <a:t>12/5/22</a:t>
+              <a:t>12/13/22</a:t>
             </a:fld>
             <a:endParaRPr lang="en-US" dirty="0"/>
           </a:p>
@@ -6858,7 +6858,7 @@
             <a:fld id="{1160EA64-D806-43AC-9DF2-F8C432F32B4C}" type="datetimeFigureOut">
               <a:rPr lang="en-US" smtClean="0"/>
               <a:pPr/>
-              <a:t>12/5/22</a:t>
+              <a:t>12/13/22</a:t>
             </a:fld>
             <a:endParaRPr lang="en-US" dirty="0"/>
           </a:p>
@@ -8862,8 +8862,8 @@
           </a:p>
         </p:txBody>
       </p:sp>
-      <mc:AlternateContent xmlns:mc="http://schemas.openxmlformats.org/markup-compatibility/2006">
-        <mc:Choice xmlns:a14="http://schemas.microsoft.com/office/drawing/2010/main" Requires="a14">
+      <mc:AlternateContent xmlns:mc="http://schemas.openxmlformats.org/markup-compatibility/2006" xmlns:a14="http://schemas.microsoft.com/office/drawing/2010/main">
+        <mc:Choice Requires="a14">
           <p:sp>
             <p:nvSpPr>
               <p:cNvPr id="46" name="TextBox 45">
@@ -10451,7 +10451,7 @@
             </p:txBody>
           </p:sp>
         </mc:Choice>
-        <mc:Fallback>
+        <mc:Fallback xmlns="">
           <p:sp>
             <p:nvSpPr>
               <p:cNvPr id="46" name="TextBox 45">
@@ -10726,8 +10726,8 @@
           </a:p>
         </p:txBody>
       </p:sp>
-      <mc:AlternateContent xmlns:mc="http://schemas.openxmlformats.org/markup-compatibility/2006">
-        <mc:Choice xmlns:a14="http://schemas.microsoft.com/office/drawing/2010/main" Requires="a14">
+      <mc:AlternateContent xmlns:mc="http://schemas.openxmlformats.org/markup-compatibility/2006" xmlns:a14="http://schemas.microsoft.com/office/drawing/2010/main">
+        <mc:Choice Requires="a14">
           <p:sp>
             <p:nvSpPr>
               <p:cNvPr id="56" name="TextBox 55">
@@ -11106,7 +11106,7 @@
             </p:txBody>
           </p:sp>
         </mc:Choice>
-        <mc:Fallback>
+        <mc:Fallback xmlns="">
           <p:sp>
             <p:nvSpPr>
               <p:cNvPr id="56" name="TextBox 55">
@@ -13925,13 +13925,13 @@
   <p:clrMapOvr>
     <a:masterClrMapping/>
   </p:clrMapOvr>
-  <mc:AlternateContent xmlns:mc="http://schemas.openxmlformats.org/markup-compatibility/2006">
-    <mc:Choice xmlns:p14="http://schemas.microsoft.com/office/powerpoint/2010/main" Requires="p14">
+  <mc:AlternateContent xmlns:mc="http://schemas.openxmlformats.org/markup-compatibility/2006" xmlns:p14="http://schemas.microsoft.com/office/powerpoint/2010/main">
+    <mc:Choice Requires="p14">
       <p:transition spd="slow" p14:dur="4000">
         <p14:vortex dir="r"/>
       </p:transition>
     </mc:Choice>
-    <mc:Fallback>
+    <mc:Fallback xmlns="">
       <p:transition spd="slow">
         <p:fade/>
       </p:transition>
@@ -16321,8 +16321,8 @@
           </a:p>
         </p:txBody>
       </p:sp>
-      <mc:AlternateContent xmlns:mc="http://schemas.openxmlformats.org/markup-compatibility/2006">
-        <mc:Choice xmlns:a14="http://schemas.microsoft.com/office/drawing/2010/main" Requires="a14">
+      <mc:AlternateContent xmlns:mc="http://schemas.openxmlformats.org/markup-compatibility/2006" xmlns:a14="http://schemas.microsoft.com/office/drawing/2010/main">
+        <mc:Choice Requires="a14">
           <p:sp>
             <p:nvSpPr>
               <p:cNvPr id="46" name="TextBox 45">
@@ -17910,7 +17910,7 @@
             </p:txBody>
           </p:sp>
         </mc:Choice>
-        <mc:Fallback>
+        <mc:Fallback xmlns="">
           <p:sp>
             <p:nvSpPr>
               <p:cNvPr id="46" name="TextBox 45">
@@ -18185,8 +18185,8 @@
           </a:p>
         </p:txBody>
       </p:sp>
-      <mc:AlternateContent xmlns:mc="http://schemas.openxmlformats.org/markup-compatibility/2006">
-        <mc:Choice xmlns:a14="http://schemas.microsoft.com/office/drawing/2010/main" Requires="a14">
+      <mc:AlternateContent xmlns:mc="http://schemas.openxmlformats.org/markup-compatibility/2006" xmlns:a14="http://schemas.microsoft.com/office/drawing/2010/main">
+        <mc:Choice Requires="a14">
           <p:sp>
             <p:nvSpPr>
               <p:cNvPr id="56" name="TextBox 55">
@@ -18565,7 +18565,7 @@
             </p:txBody>
           </p:sp>
         </mc:Choice>
-        <mc:Fallback>
+        <mc:Fallback xmlns="">
           <p:sp>
             <p:nvSpPr>
               <p:cNvPr id="56" name="TextBox 55">
@@ -22654,13 +22654,13 @@
   <p:clrMapOvr>
     <a:masterClrMapping/>
   </p:clrMapOvr>
-  <mc:AlternateContent xmlns:mc="http://schemas.openxmlformats.org/markup-compatibility/2006">
-    <mc:Choice xmlns:p14="http://schemas.microsoft.com/office/powerpoint/2010/main" Requires="p14">
+  <mc:AlternateContent xmlns:mc="http://schemas.openxmlformats.org/markup-compatibility/2006" xmlns:p14="http://schemas.microsoft.com/office/powerpoint/2010/main">
+    <mc:Choice Requires="p14">
       <p:transition spd="slow" p14:dur="1400">
         <p14:ripple/>
       </p:transition>
     </mc:Choice>
-    <mc:Fallback>
+    <mc:Fallback xmlns="">
       <p:transition spd="slow">
         <p:fade/>
       </p:transition>
@@ -24258,8 +24258,8 @@
           </a:p>
         </p:txBody>
       </p:sp>
-      <mc:AlternateContent xmlns:mc="http://schemas.openxmlformats.org/markup-compatibility/2006">
-        <mc:Choice xmlns:a14="http://schemas.microsoft.com/office/drawing/2010/main" Requires="a14">
+      <mc:AlternateContent xmlns:mc="http://schemas.openxmlformats.org/markup-compatibility/2006" xmlns:a14="http://schemas.microsoft.com/office/drawing/2010/main">
+        <mc:Choice Requires="a14">
           <p:sp>
             <p:nvSpPr>
               <p:cNvPr id="46" name="TextBox 45">
@@ -25847,7 +25847,7 @@
             </p:txBody>
           </p:sp>
         </mc:Choice>
-        <mc:Fallback>
+        <mc:Fallback xmlns="">
           <p:sp>
             <p:nvSpPr>
               <p:cNvPr id="46" name="TextBox 45">
@@ -26122,8 +26122,8 @@
           </a:p>
         </p:txBody>
       </p:sp>
-      <mc:AlternateContent xmlns:mc="http://schemas.openxmlformats.org/markup-compatibility/2006">
-        <mc:Choice xmlns:a14="http://schemas.microsoft.com/office/drawing/2010/main" Requires="a14">
+      <mc:AlternateContent xmlns:mc="http://schemas.openxmlformats.org/markup-compatibility/2006" xmlns:a14="http://schemas.microsoft.com/office/drawing/2010/main">
+        <mc:Choice Requires="a14">
           <p:sp>
             <p:nvSpPr>
               <p:cNvPr id="56" name="TextBox 55">
@@ -26502,7 +26502,7 @@
             </p:txBody>
           </p:sp>
         </mc:Choice>
-        <mc:Fallback>
+        <mc:Fallback xmlns="">
           <p:sp>
             <p:nvSpPr>
               <p:cNvPr id="56" name="TextBox 55">
@@ -29883,13 +29883,13 @@
   <p:clrMapOvr>
     <a:masterClrMapping/>
   </p:clrMapOvr>
-  <mc:AlternateContent xmlns:mc="http://schemas.openxmlformats.org/markup-compatibility/2006">
-    <mc:Choice xmlns:p14="http://schemas.microsoft.com/office/powerpoint/2010/main" Requires="p14">
+  <mc:AlternateContent xmlns:mc="http://schemas.openxmlformats.org/markup-compatibility/2006" xmlns:p14="http://schemas.microsoft.com/office/powerpoint/2010/main">
+    <mc:Choice Requires="p14">
       <p:transition spd="slow" p14:dur="1400">
         <p14:ripple/>
       </p:transition>
     </mc:Choice>
-    <mc:Fallback>
+    <mc:Fallback xmlns="">
       <p:transition spd="slow">
         <p:fade/>
       </p:transition>
@@ -31177,14 +31177,49 @@
                 <a:latin typeface="Times New Roman" panose="02020603050405020304" pitchFamily="18" charset="0"/>
                 <a:cs typeface="Times New Roman" panose="02020603050405020304" pitchFamily="18" charset="0"/>
               </a:rPr>
-              <a:t>Dividend: </a:t>
+              <a:t>Dividend</a:t>
+            </a:r>
+            <a:r>
+              <a:rPr lang="en-US" sz="3000" b="1" i="1" u="sng">
+                <a:latin typeface="Times New Roman" panose="02020603050405020304" pitchFamily="18" charset="0"/>
+                <a:cs typeface="Times New Roman" panose="02020603050405020304" pitchFamily="18" charset="0"/>
+              </a:rPr>
+              <a:t>: </a:t>
+            </a:r>
+            <a:r>
+              <a:rPr lang="en-US" sz="3000" b="1" dirty="0">
+                <a:latin typeface="Times New Roman" panose="02020603050405020304" pitchFamily="18" charset="0"/>
+                <a:cs typeface="Times New Roman" panose="02020603050405020304" pitchFamily="18" charset="0"/>
+              </a:rPr>
+              <a:t>1</a:t>
+            </a:r>
+            <a:r>
+              <a:rPr lang="en-US" sz="3000">
+                <a:latin typeface="Times New Roman" panose="02020603050405020304" pitchFamily="18" charset="0"/>
+                <a:cs typeface="Times New Roman" panose="02020603050405020304" pitchFamily="18" charset="0"/>
+              </a:rPr>
+              <a:t> </a:t>
             </a:r>
             <a:r>
               <a:rPr lang="en-US" sz="3000" dirty="0">
                 <a:latin typeface="Times New Roman" panose="02020603050405020304" pitchFamily="18" charset="0"/>
                 <a:cs typeface="Times New Roman" panose="02020603050405020304" pitchFamily="18" charset="0"/>
               </a:rPr>
-              <a:t>0 for dividend; 1 for no dividend</a:t>
+              <a:t>for dividend</a:t>
+            </a:r>
+            <a:r>
+              <a:rPr lang="en-US" sz="3000">
+                <a:latin typeface="Times New Roman" panose="02020603050405020304" pitchFamily="18" charset="0"/>
+                <a:cs typeface="Times New Roman" panose="02020603050405020304" pitchFamily="18" charset="0"/>
+              </a:rPr>
+              <a:t>; 0 </a:t>
+            </a:r>
+            <a:r>
+              <a:rPr lang="en-US" sz="3000" dirty="0">
+                <a:latin typeface="Times New Roman" panose="02020603050405020304" pitchFamily="18" charset="0"/>
+                <a:cs typeface="Times New Roman" panose="02020603050405020304" pitchFamily="18" charset="0"/>
+              </a:rPr>
+              <a:t>for no dividend</a:t>
             </a:r>
           </a:p>
           <a:p>
@@ -31288,7 +31323,7 @@
                 <a:latin typeface="Times New Roman" panose="02020603050405020304" pitchFamily="18" charset="0"/>
                 <a:cs typeface="Times New Roman" panose="02020603050405020304" pitchFamily="18" charset="0"/>
               </a:rPr>
-              <a:t>Measure of the extent to which a co5mpany covers its debt. </a:t>
+              <a:t>Measure of the extent to which a company covers its debt. </a:t>
             </a:r>
           </a:p>
           <a:p>
@@ -31444,8 +31479,8 @@
           </a:p>
         </p:txBody>
       </p:sp>
-      <mc:AlternateContent xmlns:mc="http://schemas.openxmlformats.org/markup-compatibility/2006">
-        <mc:Choice xmlns:a14="http://schemas.microsoft.com/office/drawing/2010/main" Requires="a14">
+      <mc:AlternateContent xmlns:mc="http://schemas.openxmlformats.org/markup-compatibility/2006" xmlns:a14="http://schemas.microsoft.com/office/drawing/2010/main">
+        <mc:Choice Requires="a14">
           <p:sp>
             <p:nvSpPr>
               <p:cNvPr id="46" name="TextBox 45">
@@ -33033,7 +33068,7 @@
             </p:txBody>
           </p:sp>
         </mc:Choice>
-        <mc:Fallback>
+        <mc:Fallback xmlns="">
           <p:sp>
             <p:nvSpPr>
               <p:cNvPr id="46" name="TextBox 45">
@@ -33308,8 +33343,8 @@
           </a:p>
         </p:txBody>
       </p:sp>
-      <mc:AlternateContent xmlns:mc="http://schemas.openxmlformats.org/markup-compatibility/2006">
-        <mc:Choice xmlns:a14="http://schemas.microsoft.com/office/drawing/2010/main" Requires="a14">
+      <mc:AlternateContent xmlns:mc="http://schemas.openxmlformats.org/markup-compatibility/2006" xmlns:a14="http://schemas.microsoft.com/office/drawing/2010/main">
+        <mc:Choice Requires="a14">
           <p:sp>
             <p:nvSpPr>
               <p:cNvPr id="56" name="TextBox 55">
@@ -33688,7 +33723,7 @@
             </p:txBody>
           </p:sp>
         </mc:Choice>
-        <mc:Fallback>
+        <mc:Fallback xmlns="">
           <p:sp>
             <p:nvSpPr>
               <p:cNvPr id="56" name="TextBox 55">
@@ -39180,13 +39215,13 @@
   <p:clrMapOvr>
     <a:masterClrMapping/>
   </p:clrMapOvr>
-  <mc:AlternateContent xmlns:mc="http://schemas.openxmlformats.org/markup-compatibility/2006">
-    <mc:Choice xmlns:p14="http://schemas.microsoft.com/office/powerpoint/2010/main" Requires="p14">
+  <mc:AlternateContent xmlns:mc="http://schemas.openxmlformats.org/markup-compatibility/2006" xmlns:p14="http://schemas.microsoft.com/office/powerpoint/2010/main">
+    <mc:Choice Requires="p14">
       <p:transition spd="slow" p14:dur="4400">
         <p14:honeycomb/>
       </p:transition>
     </mc:Choice>
-    <mc:Fallback>
+    <mc:Fallback xmlns="">
       <p:transition spd="slow">
         <p:fade/>
       </p:transition>

</xml_diff>